<commit_message>
Updated pptx and Project Plan Update v2.docx
</commit_message>
<xml_diff>
--- a/PM docs/Presentation.pptx
+++ b/PM docs/Presentation.pptx
@@ -10,16 +10,17 @@
     <p:sldId id="270" r:id="rId4"/>
     <p:sldId id="257" r:id="rId5"/>
     <p:sldId id="258" r:id="rId6"/>
-    <p:sldId id="259" r:id="rId7"/>
-    <p:sldId id="271" r:id="rId8"/>
+    <p:sldId id="271" r:id="rId7"/>
+    <p:sldId id="259" r:id="rId8"/>
     <p:sldId id="263" r:id="rId9"/>
-    <p:sldId id="260" r:id="rId10"/>
-    <p:sldId id="262" r:id="rId11"/>
-    <p:sldId id="261" r:id="rId12"/>
-    <p:sldId id="264" r:id="rId13"/>
-    <p:sldId id="267" r:id="rId14"/>
-    <p:sldId id="268" r:id="rId15"/>
-    <p:sldId id="266" r:id="rId16"/>
+    <p:sldId id="267" r:id="rId10"/>
+    <p:sldId id="268" r:id="rId11"/>
+    <p:sldId id="272" r:id="rId12"/>
+    <p:sldId id="260" r:id="rId13"/>
+    <p:sldId id="262" r:id="rId14"/>
+    <p:sldId id="261" r:id="rId15"/>
+    <p:sldId id="264" r:id="rId16"/>
+    <p:sldId id="266" r:id="rId17"/>
   </p:sldIdLst>
   <p:sldSz cx="9144000" cy="6858000" type="screen4x3"/>
   <p:notesSz cx="6858000" cy="9144000"/>
@@ -17755,6 +17756,414 @@
           <a:bodyPr/>
           <a:lstStyle/>
           <a:p>
+            <a:endParaRPr lang="en-GB"/>
+          </a:p>
+        </p:txBody>
+      </p:sp>
+      <p:graphicFrame>
+        <p:nvGraphicFramePr>
+          <p:cNvPr id="4" name="資料庫圖表 11"/>
+          <p:cNvGraphicFramePr>
+            <a:graphicFrameLocks noGrp="1"/>
+          </p:cNvGraphicFramePr>
+          <p:nvPr>
+            <p:ph idx="1"/>
+            <p:extLst>
+              <p:ext uri="{D42A27DB-BD31-4B8C-83A1-F6EECF244321}">
+                <p14:modId xmlns:p14="http://schemas.microsoft.com/office/powerpoint/2010/main" val="2047569850"/>
+              </p:ext>
+            </p:extLst>
+          </p:nvPr>
+        </p:nvGraphicFramePr>
+        <p:xfrm>
+          <a:off x="628650" y="365126"/>
+          <a:ext cx="7886700" cy="5811837"/>
+        </p:xfrm>
+        <a:graphic>
+          <a:graphicData uri="http://schemas.openxmlformats.org/drawingml/2006/diagram">
+            <dgm:relIds xmlns:dgm="http://schemas.openxmlformats.org/drawingml/2006/diagram" xmlns:r="http://schemas.openxmlformats.org/officeDocument/2006/relationships" r:dm="rId2" r:lo="rId3" r:qs="rId4" r:cs="rId5"/>
+          </a:graphicData>
+        </a:graphic>
+      </p:graphicFrame>
+    </p:spTree>
+    <p:extLst>
+      <p:ext uri="{BB962C8B-B14F-4D97-AF65-F5344CB8AC3E}">
+        <p14:creationId xmlns:p14="http://schemas.microsoft.com/office/powerpoint/2010/main" val="4209368434"/>
+      </p:ext>
+    </p:extLst>
+  </p:cSld>
+  <p:clrMapOvr>
+    <a:masterClrMapping/>
+  </p:clrMapOvr>
+</p:sld>
+</file>
+
+<file path=ppt/slides/slide11.xml><?xml version="1.0" encoding="utf-8"?>
+<p:sld xmlns:a="http://schemas.openxmlformats.org/drawingml/2006/main" xmlns:r="http://schemas.openxmlformats.org/officeDocument/2006/relationships" xmlns:p="http://schemas.openxmlformats.org/presentationml/2006/main">
+  <p:cSld>
+    <p:spTree>
+      <p:nvGrpSpPr>
+        <p:cNvPr id="1" name=""/>
+        <p:cNvGrpSpPr/>
+        <p:nvPr/>
+      </p:nvGrpSpPr>
+      <p:grpSpPr>
+        <a:xfrm>
+          <a:off x="0" y="0"/>
+          <a:ext cx="0" cy="0"/>
+          <a:chOff x="0" y="0"/>
+          <a:chExt cx="0" cy="0"/>
+        </a:xfrm>
+      </p:grpSpPr>
+      <p:sp>
+        <p:nvSpPr>
+          <p:cNvPr id="2" name="Title 1"/>
+          <p:cNvSpPr>
+            <a:spLocks noGrp="1"/>
+          </p:cNvSpPr>
+          <p:nvPr>
+            <p:ph type="title"/>
+          </p:nvPr>
+        </p:nvSpPr>
+        <p:spPr/>
+        <p:txBody>
+          <a:bodyPr/>
+          <a:lstStyle/>
+          <a:p>
+            <a:r>
+              <a:rPr lang="en-GB" dirty="0" smtClean="0"/>
+              <a:t>Class Scheduler - Environment</a:t>
+            </a:r>
+            <a:endParaRPr lang="en-GB" dirty="0"/>
+          </a:p>
+        </p:txBody>
+      </p:sp>
+      <p:graphicFrame>
+        <p:nvGraphicFramePr>
+          <p:cNvPr id="6" name="Content Placeholder 5"/>
+          <p:cNvGraphicFramePr>
+            <a:graphicFrameLocks noGrp="1"/>
+          </p:cNvGraphicFramePr>
+          <p:nvPr>
+            <p:ph idx="1"/>
+            <p:extLst>
+              <p:ext uri="{D42A27DB-BD31-4B8C-83A1-F6EECF244321}">
+                <p14:modId xmlns:p14="http://schemas.microsoft.com/office/powerpoint/2010/main" val="922293617"/>
+              </p:ext>
+            </p:extLst>
+          </p:nvPr>
+        </p:nvGraphicFramePr>
+        <p:xfrm>
+          <a:off x="628650" y="1825625"/>
+          <a:ext cx="7886700" cy="1981200"/>
+        </p:xfrm>
+        <a:graphic>
+          <a:graphicData uri="http://schemas.openxmlformats.org/drawingml/2006/table">
+            <a:tbl>
+              <a:tblPr firstRow="1" bandRow="1">
+                <a:tableStyleId>{00A15C55-8517-42AA-B614-E9B94910E393}</a:tableStyleId>
+              </a:tblPr>
+              <a:tblGrid>
+                <a:gridCol w="3943350"/>
+                <a:gridCol w="3943350"/>
+              </a:tblGrid>
+              <a:tr h="370840">
+                <a:tc>
+                  <a:txBody>
+                    <a:bodyPr/>
+                    <a:lstStyle/>
+                    <a:p>
+                      <a:pPr algn="ctr"/>
+                      <a:r>
+                        <a:rPr lang="en-GB" sz="2000" dirty="0" smtClean="0"/>
+                        <a:t>Tool</a:t>
+                      </a:r>
+                      <a:endParaRPr lang="en-GB" sz="2000" dirty="0"/>
+                    </a:p>
+                  </a:txBody>
+                  <a:tcPr/>
+                </a:tc>
+                <a:tc>
+                  <a:txBody>
+                    <a:bodyPr/>
+                    <a:lstStyle/>
+                    <a:p>
+                      <a:pPr algn="ctr"/>
+                      <a:r>
+                        <a:rPr lang="en-GB" sz="2000" dirty="0" smtClean="0"/>
+                        <a:t>Usage</a:t>
+                      </a:r>
+                      <a:endParaRPr lang="en-GB" sz="2000" dirty="0"/>
+                    </a:p>
+                  </a:txBody>
+                  <a:tcPr/>
+                </a:tc>
+              </a:tr>
+              <a:tr h="370840">
+                <a:tc>
+                  <a:txBody>
+                    <a:bodyPr/>
+                    <a:lstStyle/>
+                    <a:p>
+                      <a:r>
+                        <a:rPr lang="en-GB" sz="2000" dirty="0" smtClean="0"/>
+                        <a:t>Google Code</a:t>
+                      </a:r>
+                      <a:endParaRPr lang="en-GB" sz="2000" dirty="0"/>
+                    </a:p>
+                  </a:txBody>
+                  <a:tcPr/>
+                </a:tc>
+                <a:tc>
+                  <a:txBody>
+                    <a:bodyPr/>
+                    <a:lstStyle/>
+                    <a:p>
+                      <a:r>
+                        <a:rPr lang="en-GB" sz="2000" dirty="0" smtClean="0"/>
+                        <a:t>Repository</a:t>
+                      </a:r>
+                    </a:p>
+                  </a:txBody>
+                  <a:tcPr/>
+                </a:tc>
+              </a:tr>
+              <a:tr h="370840">
+                <a:tc>
+                  <a:txBody>
+                    <a:bodyPr/>
+                    <a:lstStyle/>
+                    <a:p>
+                      <a:r>
+                        <a:rPr lang="en-GB" sz="2000" dirty="0" err="1" smtClean="0"/>
+                        <a:t>TortoiseSVN</a:t>
+                      </a:r>
+                      <a:endParaRPr lang="en-GB" sz="2000" dirty="0"/>
+                    </a:p>
+                  </a:txBody>
+                  <a:tcPr/>
+                </a:tc>
+                <a:tc>
+                  <a:txBody>
+                    <a:bodyPr/>
+                    <a:lstStyle/>
+                    <a:p>
+                      <a:r>
+                        <a:rPr lang="en-GB" sz="2000" dirty="0" smtClean="0"/>
+                        <a:t>Version</a:t>
+                      </a:r>
+                      <a:r>
+                        <a:rPr lang="en-GB" sz="2000" baseline="0" dirty="0" smtClean="0"/>
+                        <a:t> Control</a:t>
+                      </a:r>
+                    </a:p>
+                  </a:txBody>
+                  <a:tcPr/>
+                </a:tc>
+              </a:tr>
+              <a:tr h="370840">
+                <a:tc>
+                  <a:txBody>
+                    <a:bodyPr/>
+                    <a:lstStyle/>
+                    <a:p>
+                      <a:r>
+                        <a:rPr lang="en-GB" sz="2000" dirty="0" smtClean="0"/>
+                        <a:t>Eclipse</a:t>
+                      </a:r>
+                      <a:endParaRPr lang="en-GB" sz="2000" dirty="0"/>
+                    </a:p>
+                  </a:txBody>
+                  <a:tcPr/>
+                </a:tc>
+                <a:tc>
+                  <a:txBody>
+                    <a:bodyPr/>
+                    <a:lstStyle/>
+                    <a:p>
+                      <a:r>
+                        <a:rPr lang="en-GB" sz="2000" baseline="0" dirty="0" smtClean="0"/>
+                        <a:t>IDE</a:t>
+                      </a:r>
+                    </a:p>
+                  </a:txBody>
+                  <a:tcPr/>
+                </a:tc>
+              </a:tr>
+              <a:tr h="370840">
+                <a:tc>
+                  <a:txBody>
+                    <a:bodyPr/>
+                    <a:lstStyle/>
+                    <a:p>
+                      <a:r>
+                        <a:rPr lang="en-GB" sz="2000" dirty="0" err="1" smtClean="0"/>
+                        <a:t>JUnit</a:t>
+                      </a:r>
+                      <a:endParaRPr lang="en-GB" sz="2000" dirty="0"/>
+                    </a:p>
+                  </a:txBody>
+                  <a:tcPr/>
+                </a:tc>
+                <a:tc>
+                  <a:txBody>
+                    <a:bodyPr/>
+                    <a:lstStyle/>
+                    <a:p>
+                      <a:r>
+                        <a:rPr lang="en-GB" sz="2000" baseline="0" dirty="0" smtClean="0"/>
+                        <a:t>Testing</a:t>
+                      </a:r>
+                    </a:p>
+                  </a:txBody>
+                  <a:tcPr/>
+                </a:tc>
+              </a:tr>
+            </a:tbl>
+          </a:graphicData>
+        </a:graphic>
+      </p:graphicFrame>
+    </p:spTree>
+    <p:extLst>
+      <p:ext uri="{BB962C8B-B14F-4D97-AF65-F5344CB8AC3E}">
+        <p14:creationId xmlns:p14="http://schemas.microsoft.com/office/powerpoint/2010/main" val="3862418655"/>
+      </p:ext>
+    </p:extLst>
+  </p:cSld>
+  <p:clrMapOvr>
+    <a:masterClrMapping/>
+  </p:clrMapOvr>
+</p:sld>
+</file>
+
+<file path=ppt/slides/slide12.xml><?xml version="1.0" encoding="utf-8"?>
+<p:sld xmlns:a="http://schemas.openxmlformats.org/drawingml/2006/main" xmlns:r="http://schemas.openxmlformats.org/officeDocument/2006/relationships" xmlns:p="http://schemas.openxmlformats.org/presentationml/2006/main">
+  <p:cSld>
+    <p:spTree>
+      <p:nvGrpSpPr>
+        <p:cNvPr id="1" name=""/>
+        <p:cNvGrpSpPr/>
+        <p:nvPr/>
+      </p:nvGrpSpPr>
+      <p:grpSpPr>
+        <a:xfrm>
+          <a:off x="0" y="0"/>
+          <a:ext cx="0" cy="0"/>
+          <a:chOff x="0" y="0"/>
+          <a:chExt cx="0" cy="0"/>
+        </a:xfrm>
+      </p:grpSpPr>
+      <p:sp>
+        <p:nvSpPr>
+          <p:cNvPr id="2" name="Title 1"/>
+          <p:cNvSpPr>
+            <a:spLocks noGrp="1"/>
+          </p:cNvSpPr>
+          <p:nvPr>
+            <p:ph type="title"/>
+          </p:nvPr>
+        </p:nvSpPr>
+        <p:spPr/>
+        <p:txBody>
+          <a:bodyPr/>
+          <a:lstStyle/>
+          <a:p>
+            <a:r>
+              <a:rPr lang="en-GB" dirty="0" smtClean="0"/>
+              <a:t>Class Scheduler - Environment</a:t>
+            </a:r>
+            <a:endParaRPr lang="en-GB" dirty="0"/>
+          </a:p>
+        </p:txBody>
+      </p:sp>
+      <p:sp>
+        <p:nvSpPr>
+          <p:cNvPr id="4" name="Content Placeholder 3"/>
+          <p:cNvSpPr>
+            <a:spLocks noGrp="1"/>
+          </p:cNvSpPr>
+          <p:nvPr>
+            <p:ph idx="1"/>
+          </p:nvPr>
+        </p:nvSpPr>
+        <p:spPr/>
+        <p:txBody>
+          <a:bodyPr/>
+          <a:lstStyle/>
+          <a:p>
+            <a:endParaRPr lang="en-GB" dirty="0"/>
+          </a:p>
+        </p:txBody>
+      </p:sp>
+      <p:pic>
+        <p:nvPicPr>
+          <p:cNvPr id="3" name="Picture 2"/>
+          <p:cNvPicPr>
+            <a:picLocks noChangeAspect="1"/>
+          </p:cNvPicPr>
+          <p:nvPr/>
+        </p:nvPicPr>
+        <p:blipFill>
+          <a:blip r:embed="rId2"/>
+          <a:stretch>
+            <a:fillRect/>
+          </a:stretch>
+        </p:blipFill>
+        <p:spPr>
+          <a:xfrm>
+            <a:off x="628651" y="1825625"/>
+            <a:ext cx="7911728" cy="4448175"/>
+          </a:xfrm>
+          <a:prstGeom prst="rect">
+            <a:avLst/>
+          </a:prstGeom>
+        </p:spPr>
+      </p:pic>
+    </p:spTree>
+    <p:extLst>
+      <p:ext uri="{BB962C8B-B14F-4D97-AF65-F5344CB8AC3E}">
+        <p14:creationId xmlns:p14="http://schemas.microsoft.com/office/powerpoint/2010/main" val="3237865628"/>
+      </p:ext>
+    </p:extLst>
+  </p:cSld>
+  <p:clrMapOvr>
+    <a:masterClrMapping/>
+  </p:clrMapOvr>
+</p:sld>
+</file>
+
+<file path=ppt/slides/slide13.xml><?xml version="1.0" encoding="utf-8"?>
+<p:sld xmlns:a="http://schemas.openxmlformats.org/drawingml/2006/main" xmlns:r="http://schemas.openxmlformats.org/officeDocument/2006/relationships" xmlns:p="http://schemas.openxmlformats.org/presentationml/2006/main">
+  <p:cSld>
+    <p:spTree>
+      <p:nvGrpSpPr>
+        <p:cNvPr id="1" name=""/>
+        <p:cNvGrpSpPr/>
+        <p:nvPr/>
+      </p:nvGrpSpPr>
+      <p:grpSpPr>
+        <a:xfrm>
+          <a:off x="0" y="0"/>
+          <a:ext cx="0" cy="0"/>
+          <a:chOff x="0" y="0"/>
+          <a:chExt cx="0" cy="0"/>
+        </a:xfrm>
+      </p:grpSpPr>
+      <p:sp>
+        <p:nvSpPr>
+          <p:cNvPr id="2" name="Title 1"/>
+          <p:cNvSpPr>
+            <a:spLocks noGrp="1"/>
+          </p:cNvSpPr>
+          <p:nvPr>
+            <p:ph type="title"/>
+          </p:nvPr>
+        </p:nvSpPr>
+        <p:spPr/>
+        <p:txBody>
+          <a:bodyPr/>
+          <a:lstStyle/>
+          <a:p>
             <a:r>
               <a:rPr lang="en-GB" dirty="0"/>
               <a:t>Class Scheduler - Environment</a:t>
@@ -17818,7 +18227,7 @@
 </p:sld>
 </file>
 
-<file path=ppt/slides/slide11.xml><?xml version="1.0" encoding="utf-8"?>
+<file path=ppt/slides/slide14.xml><?xml version="1.0" encoding="utf-8"?>
 <p:sld xmlns:a="http://schemas.openxmlformats.org/drawingml/2006/main" xmlns:r="http://schemas.openxmlformats.org/officeDocument/2006/relationships" xmlns:p="http://schemas.openxmlformats.org/presentationml/2006/main">
   <p:cSld>
     <p:spTree>
@@ -17913,7 +18322,7 @@
 </p:sld>
 </file>
 
-<file path=ppt/slides/slide12.xml><?xml version="1.0" encoding="utf-8"?>
+<file path=ppt/slides/slide15.xml><?xml version="1.0" encoding="utf-8"?>
 <p:sld xmlns:a="http://schemas.openxmlformats.org/drawingml/2006/main" xmlns:r="http://schemas.openxmlformats.org/officeDocument/2006/relationships" xmlns:p="http://schemas.openxmlformats.org/presentationml/2006/main">
   <p:cSld>
     <p:spTree>
@@ -18008,155 +18417,7 @@
 </p:sld>
 </file>
 
-<file path=ppt/slides/slide13.xml><?xml version="1.0" encoding="utf-8"?>
-<p:sld xmlns:a="http://schemas.openxmlformats.org/drawingml/2006/main" xmlns:r="http://schemas.openxmlformats.org/officeDocument/2006/relationships" xmlns:p="http://schemas.openxmlformats.org/presentationml/2006/main">
-  <p:cSld>
-    <p:spTree>
-      <p:nvGrpSpPr>
-        <p:cNvPr id="1" name=""/>
-        <p:cNvGrpSpPr/>
-        <p:nvPr/>
-      </p:nvGrpSpPr>
-      <p:grpSpPr>
-        <a:xfrm>
-          <a:off x="0" y="0"/>
-          <a:ext cx="0" cy="0"/>
-          <a:chOff x="0" y="0"/>
-          <a:chExt cx="0" cy="0"/>
-        </a:xfrm>
-      </p:grpSpPr>
-      <p:sp>
-        <p:nvSpPr>
-          <p:cNvPr id="2" name="Title 1"/>
-          <p:cNvSpPr>
-            <a:spLocks noGrp="1"/>
-          </p:cNvSpPr>
-          <p:nvPr>
-            <p:ph type="title"/>
-          </p:nvPr>
-        </p:nvSpPr>
-        <p:spPr/>
-        <p:txBody>
-          <a:bodyPr/>
-          <a:lstStyle/>
-          <a:p>
-            <a:endParaRPr lang="en-GB"/>
-          </a:p>
-        </p:txBody>
-      </p:sp>
-      <p:graphicFrame>
-        <p:nvGraphicFramePr>
-          <p:cNvPr id="4" name="資料庫圖表 11"/>
-          <p:cNvGraphicFramePr>
-            <a:graphicFrameLocks noGrp="1"/>
-          </p:cNvGraphicFramePr>
-          <p:nvPr>
-            <p:ph idx="1"/>
-            <p:extLst>
-              <p:ext uri="{D42A27DB-BD31-4B8C-83A1-F6EECF244321}">
-                <p14:modId xmlns:p14="http://schemas.microsoft.com/office/powerpoint/2010/main" val="2582293158"/>
-              </p:ext>
-            </p:extLst>
-          </p:nvPr>
-        </p:nvGraphicFramePr>
-        <p:xfrm>
-          <a:off x="628650" y="365126"/>
-          <a:ext cx="7886700" cy="5811837"/>
-        </p:xfrm>
-        <a:graphic>
-          <a:graphicData uri="http://schemas.openxmlformats.org/drawingml/2006/diagram">
-            <dgm:relIds xmlns:dgm="http://schemas.openxmlformats.org/drawingml/2006/diagram" xmlns:r="http://schemas.openxmlformats.org/officeDocument/2006/relationships" r:dm="rId2" r:lo="rId3" r:qs="rId4" r:cs="rId5"/>
-          </a:graphicData>
-        </a:graphic>
-      </p:graphicFrame>
-    </p:spTree>
-    <p:extLst>
-      <p:ext uri="{BB962C8B-B14F-4D97-AF65-F5344CB8AC3E}">
-        <p14:creationId xmlns:p14="http://schemas.microsoft.com/office/powerpoint/2010/main" val="3296529199"/>
-      </p:ext>
-    </p:extLst>
-  </p:cSld>
-  <p:clrMapOvr>
-    <a:masterClrMapping/>
-  </p:clrMapOvr>
-</p:sld>
-</file>
-
-<file path=ppt/slides/slide14.xml><?xml version="1.0" encoding="utf-8"?>
-<p:sld xmlns:a="http://schemas.openxmlformats.org/drawingml/2006/main" xmlns:r="http://schemas.openxmlformats.org/officeDocument/2006/relationships" xmlns:p="http://schemas.openxmlformats.org/presentationml/2006/main">
-  <p:cSld>
-    <p:spTree>
-      <p:nvGrpSpPr>
-        <p:cNvPr id="1" name=""/>
-        <p:cNvGrpSpPr/>
-        <p:nvPr/>
-      </p:nvGrpSpPr>
-      <p:grpSpPr>
-        <a:xfrm>
-          <a:off x="0" y="0"/>
-          <a:ext cx="0" cy="0"/>
-          <a:chOff x="0" y="0"/>
-          <a:chExt cx="0" cy="0"/>
-        </a:xfrm>
-      </p:grpSpPr>
-      <p:sp>
-        <p:nvSpPr>
-          <p:cNvPr id="2" name="Title 1"/>
-          <p:cNvSpPr>
-            <a:spLocks noGrp="1"/>
-          </p:cNvSpPr>
-          <p:nvPr>
-            <p:ph type="title"/>
-          </p:nvPr>
-        </p:nvSpPr>
-        <p:spPr/>
-        <p:txBody>
-          <a:bodyPr/>
-          <a:lstStyle/>
-          <a:p>
-            <a:endParaRPr lang="en-GB"/>
-          </a:p>
-        </p:txBody>
-      </p:sp>
-      <p:graphicFrame>
-        <p:nvGraphicFramePr>
-          <p:cNvPr id="4" name="資料庫圖表 11"/>
-          <p:cNvGraphicFramePr>
-            <a:graphicFrameLocks noGrp="1"/>
-          </p:cNvGraphicFramePr>
-          <p:nvPr>
-            <p:ph idx="1"/>
-            <p:extLst>
-              <p:ext uri="{D42A27DB-BD31-4B8C-83A1-F6EECF244321}">
-                <p14:modId xmlns:p14="http://schemas.microsoft.com/office/powerpoint/2010/main" val="2047569850"/>
-              </p:ext>
-            </p:extLst>
-          </p:nvPr>
-        </p:nvGraphicFramePr>
-        <p:xfrm>
-          <a:off x="628650" y="365126"/>
-          <a:ext cx="7886700" cy="5811837"/>
-        </p:xfrm>
-        <a:graphic>
-          <a:graphicData uri="http://schemas.openxmlformats.org/drawingml/2006/diagram">
-            <dgm:relIds xmlns:dgm="http://schemas.openxmlformats.org/drawingml/2006/diagram" xmlns:r="http://schemas.openxmlformats.org/officeDocument/2006/relationships" r:dm="rId2" r:lo="rId3" r:qs="rId4" r:cs="rId5"/>
-          </a:graphicData>
-        </a:graphic>
-      </p:graphicFrame>
-    </p:spTree>
-    <p:extLst>
-      <p:ext uri="{BB962C8B-B14F-4D97-AF65-F5344CB8AC3E}">
-        <p14:creationId xmlns:p14="http://schemas.microsoft.com/office/powerpoint/2010/main" val="4209368434"/>
-      </p:ext>
-    </p:extLst>
-  </p:cSld>
-  <p:clrMapOvr>
-    <a:masterClrMapping/>
-  </p:clrMapOvr>
-</p:sld>
-</file>
-
-<file path=ppt/slides/slide15.xml><?xml version="1.0" encoding="utf-8"?>
+<file path=ppt/slides/slide16.xml><?xml version="1.0" encoding="utf-8"?>
 <p:sld xmlns:a="http://schemas.openxmlformats.org/drawingml/2006/main" xmlns:r="http://schemas.openxmlformats.org/officeDocument/2006/relationships" xmlns:p="http://schemas.openxmlformats.org/presentationml/2006/main">
   <p:cSld>
     <p:spTree>
@@ -18558,6 +18819,15 @@
           <a:p>
             <a:r>
               <a:rPr lang="en-GB" dirty="0" smtClean="0"/>
+              <a:t>Able to detect and handle conflicts between courses</a:t>
+            </a:r>
+          </a:p>
+          <a:p>
+            <a:endParaRPr lang="en-GB" dirty="0"/>
+          </a:p>
+          <a:p>
+            <a:r>
+              <a:rPr lang="en-GB" dirty="0" smtClean="0"/>
               <a:t>Able to handle lecture and tutorial section</a:t>
             </a:r>
           </a:p>
@@ -18568,6 +18838,15 @@
             <a:r>
               <a:rPr lang="en-GB" dirty="0" smtClean="0"/>
               <a:t>Able to arrange according to priority</a:t>
+            </a:r>
+          </a:p>
+          <a:p>
+            <a:endParaRPr lang="en-GB" dirty="0"/>
+          </a:p>
+          <a:p>
+            <a:r>
+              <a:rPr lang="en-GB" dirty="0" smtClean="0"/>
+              <a:t>Able core and non-core courses.</a:t>
             </a:r>
             <a:endParaRPr lang="en-GB" dirty="0"/>
           </a:p>
@@ -18587,6 +18866,91 @@
 </file>
 
 <file path=ppt/slides/slide6.xml><?xml version="1.0" encoding="utf-8"?>
+<p:sld xmlns:a="http://schemas.openxmlformats.org/drawingml/2006/main" xmlns:r="http://schemas.openxmlformats.org/officeDocument/2006/relationships" xmlns:p="http://schemas.openxmlformats.org/presentationml/2006/main">
+  <p:cSld>
+    <p:spTree>
+      <p:nvGrpSpPr>
+        <p:cNvPr id="1" name=""/>
+        <p:cNvGrpSpPr/>
+        <p:nvPr/>
+      </p:nvGrpSpPr>
+      <p:grpSpPr>
+        <a:xfrm>
+          <a:off x="0" y="0"/>
+          <a:ext cx="0" cy="0"/>
+          <a:chOff x="0" y="0"/>
+          <a:chExt cx="0" cy="0"/>
+        </a:xfrm>
+      </p:grpSpPr>
+      <p:sp>
+        <p:nvSpPr>
+          <p:cNvPr id="2" name="Title 1"/>
+          <p:cNvSpPr>
+            <a:spLocks noGrp="1"/>
+          </p:cNvSpPr>
+          <p:nvPr>
+            <p:ph type="title"/>
+          </p:nvPr>
+        </p:nvSpPr>
+        <p:spPr/>
+        <p:txBody>
+          <a:bodyPr/>
+          <a:lstStyle/>
+          <a:p>
+            <a:r>
+              <a:rPr lang="en-GB" dirty="0" smtClean="0"/>
+              <a:t>Class Scheduler – Use Case</a:t>
+            </a:r>
+            <a:endParaRPr lang="en-GB" dirty="0"/>
+          </a:p>
+        </p:txBody>
+      </p:sp>
+      <p:pic>
+        <p:nvPicPr>
+          <p:cNvPr id="4" name="Content Placeholder 3"/>
+          <p:cNvPicPr>
+            <a:picLocks noGrp="1"/>
+          </p:cNvPicPr>
+          <p:nvPr>
+            <p:ph idx="1"/>
+          </p:nvPr>
+        </p:nvPicPr>
+        <p:blipFill>
+          <a:blip r:embed="rId2">
+            <a:extLst>
+              <a:ext uri="{28A0092B-C50C-407E-A947-70E740481C1C}">
+                <a14:useLocalDpi xmlns:a14="http://schemas.microsoft.com/office/drawing/2010/main" val="0"/>
+              </a:ext>
+            </a:extLst>
+          </a:blip>
+          <a:stretch>
+            <a:fillRect/>
+          </a:stretch>
+        </p:blipFill>
+        <p:spPr>
+          <a:xfrm>
+            <a:off x="971550" y="1962944"/>
+            <a:ext cx="7200900" cy="4076700"/>
+          </a:xfrm>
+          <a:prstGeom prst="rect">
+            <a:avLst/>
+          </a:prstGeom>
+        </p:spPr>
+      </p:pic>
+    </p:spTree>
+    <p:extLst>
+      <p:ext uri="{BB962C8B-B14F-4D97-AF65-F5344CB8AC3E}">
+        <p14:creationId xmlns:p14="http://schemas.microsoft.com/office/powerpoint/2010/main" val="4127554537"/>
+      </p:ext>
+    </p:extLst>
+  </p:cSld>
+  <p:clrMapOvr>
+    <a:masterClrMapping/>
+  </p:clrMapOvr>
+</p:sld>
+</file>
+
+<file path=ppt/slides/slide7.xml><?xml version="1.0" encoding="utf-8"?>
 <p:sld xmlns:a="http://schemas.openxmlformats.org/drawingml/2006/main" xmlns:r="http://schemas.openxmlformats.org/officeDocument/2006/relationships" xmlns:p="http://schemas.openxmlformats.org/presentationml/2006/main">
   <p:cSld>
     <p:spTree>
@@ -18677,91 +19041,6 @@
     <p:extLst>
       <p:ext uri="{BB962C8B-B14F-4D97-AF65-F5344CB8AC3E}">
         <p14:creationId xmlns:p14="http://schemas.microsoft.com/office/powerpoint/2010/main" val="3352890646"/>
-      </p:ext>
-    </p:extLst>
-  </p:cSld>
-  <p:clrMapOvr>
-    <a:masterClrMapping/>
-  </p:clrMapOvr>
-</p:sld>
-</file>
-
-<file path=ppt/slides/slide7.xml><?xml version="1.0" encoding="utf-8"?>
-<p:sld xmlns:a="http://schemas.openxmlformats.org/drawingml/2006/main" xmlns:r="http://schemas.openxmlformats.org/officeDocument/2006/relationships" xmlns:p="http://schemas.openxmlformats.org/presentationml/2006/main">
-  <p:cSld>
-    <p:spTree>
-      <p:nvGrpSpPr>
-        <p:cNvPr id="1" name=""/>
-        <p:cNvGrpSpPr/>
-        <p:nvPr/>
-      </p:nvGrpSpPr>
-      <p:grpSpPr>
-        <a:xfrm>
-          <a:off x="0" y="0"/>
-          <a:ext cx="0" cy="0"/>
-          <a:chOff x="0" y="0"/>
-          <a:chExt cx="0" cy="0"/>
-        </a:xfrm>
-      </p:grpSpPr>
-      <p:sp>
-        <p:nvSpPr>
-          <p:cNvPr id="2" name="Title 1"/>
-          <p:cNvSpPr>
-            <a:spLocks noGrp="1"/>
-          </p:cNvSpPr>
-          <p:nvPr>
-            <p:ph type="title"/>
-          </p:nvPr>
-        </p:nvSpPr>
-        <p:spPr/>
-        <p:txBody>
-          <a:bodyPr/>
-          <a:lstStyle/>
-          <a:p>
-            <a:r>
-              <a:rPr lang="en-GB" dirty="0" smtClean="0"/>
-              <a:t>Class Scheduler – Use Case</a:t>
-            </a:r>
-            <a:endParaRPr lang="en-GB" dirty="0"/>
-          </a:p>
-        </p:txBody>
-      </p:sp>
-      <p:pic>
-        <p:nvPicPr>
-          <p:cNvPr id="4" name="Content Placeholder 3"/>
-          <p:cNvPicPr>
-            <a:picLocks noGrp="1"/>
-          </p:cNvPicPr>
-          <p:nvPr>
-            <p:ph idx="1"/>
-          </p:nvPr>
-        </p:nvPicPr>
-        <p:blipFill>
-          <a:blip r:embed="rId2">
-            <a:extLst>
-              <a:ext uri="{28A0092B-C50C-407E-A947-70E740481C1C}">
-                <a14:useLocalDpi xmlns:a14="http://schemas.microsoft.com/office/drawing/2010/main" val="0"/>
-              </a:ext>
-            </a:extLst>
-          </a:blip>
-          <a:stretch>
-            <a:fillRect/>
-          </a:stretch>
-        </p:blipFill>
-        <p:spPr>
-          <a:xfrm>
-            <a:off x="971550" y="1962944"/>
-            <a:ext cx="7200900" cy="4076700"/>
-          </a:xfrm>
-          <a:prstGeom prst="rect">
-            <a:avLst/>
-          </a:prstGeom>
-        </p:spPr>
-      </p:pic>
-    </p:spTree>
-    <p:extLst>
-      <p:ext uri="{BB962C8B-B14F-4D97-AF65-F5344CB8AC3E}">
-        <p14:creationId xmlns:p14="http://schemas.microsoft.com/office/powerpoint/2010/main" val="4127554537"/>
       </p:ext>
     </p:extLst>
   </p:cSld>
@@ -18996,61 +19275,39 @@
           <a:bodyPr/>
           <a:lstStyle/>
           <a:p>
-            <a:r>
-              <a:rPr lang="en-GB" dirty="0" smtClean="0"/>
-              <a:t>Class Scheduler - Environment</a:t>
-            </a:r>
-            <a:endParaRPr lang="en-GB" dirty="0"/>
+            <a:endParaRPr lang="en-GB"/>
           </a:p>
         </p:txBody>
       </p:sp>
-      <p:sp>
-        <p:nvSpPr>
-          <p:cNvPr id="4" name="Content Placeholder 3"/>
-          <p:cNvSpPr>
-            <a:spLocks noGrp="1"/>
-          </p:cNvSpPr>
+      <p:graphicFrame>
+        <p:nvGraphicFramePr>
+          <p:cNvPr id="4" name="資料庫圖表 11"/>
+          <p:cNvGraphicFramePr>
+            <a:graphicFrameLocks noGrp="1"/>
+          </p:cNvGraphicFramePr>
           <p:nvPr>
             <p:ph idx="1"/>
+            <p:extLst>
+              <p:ext uri="{D42A27DB-BD31-4B8C-83A1-F6EECF244321}">
+                <p14:modId xmlns:p14="http://schemas.microsoft.com/office/powerpoint/2010/main" val="2582293158"/>
+              </p:ext>
+            </p:extLst>
           </p:nvPr>
-        </p:nvSpPr>
-        <p:spPr/>
-        <p:txBody>
-          <a:bodyPr/>
-          <a:lstStyle/>
-          <a:p>
-            <a:endParaRPr lang="en-GB" dirty="0"/>
-          </a:p>
-        </p:txBody>
-      </p:sp>
-      <p:pic>
-        <p:nvPicPr>
-          <p:cNvPr id="3" name="Picture 2"/>
-          <p:cNvPicPr>
-            <a:picLocks noChangeAspect="1"/>
-          </p:cNvPicPr>
-          <p:nvPr/>
-        </p:nvPicPr>
-        <p:blipFill>
-          <a:blip r:embed="rId2"/>
-          <a:stretch>
-            <a:fillRect/>
-          </a:stretch>
-        </p:blipFill>
-        <p:spPr>
-          <a:xfrm>
-            <a:off x="628651" y="1825625"/>
-            <a:ext cx="7911728" cy="4448175"/>
-          </a:xfrm>
-          <a:prstGeom prst="rect">
-            <a:avLst/>
-          </a:prstGeom>
-        </p:spPr>
-      </p:pic>
+        </p:nvGraphicFramePr>
+        <p:xfrm>
+          <a:off x="628650" y="365126"/>
+          <a:ext cx="7886700" cy="5811837"/>
+        </p:xfrm>
+        <a:graphic>
+          <a:graphicData uri="http://schemas.openxmlformats.org/drawingml/2006/diagram">
+            <dgm:relIds xmlns:dgm="http://schemas.openxmlformats.org/drawingml/2006/diagram" xmlns:r="http://schemas.openxmlformats.org/officeDocument/2006/relationships" r:dm="rId2" r:lo="rId3" r:qs="rId4" r:cs="rId5"/>
+          </a:graphicData>
+        </a:graphic>
+      </p:graphicFrame>
     </p:spTree>
     <p:extLst>
       <p:ext uri="{BB962C8B-B14F-4D97-AF65-F5344CB8AC3E}">
-        <p14:creationId xmlns:p14="http://schemas.microsoft.com/office/powerpoint/2010/main" val="3237865628"/>
+        <p14:creationId xmlns:p14="http://schemas.microsoft.com/office/powerpoint/2010/main" val="3296529199"/>
       </p:ext>
     </p:extLst>
   </p:cSld>

</xml_diff>